<commit_message>
add one line for additional examination
</commit_message>
<xml_diff>
--- a/lessons/D_Supervised/Day4_vid2.pptx
+++ b/lessons/D_Supervised/Day4_vid2.pptx
@@ -13,10 +13,10 @@
     <p:sldId id="392" r:id="rId4"/>
     <p:sldId id="450" r:id="rId5"/>
     <p:sldId id="386" r:id="rId6"/>
-    <p:sldId id="817" r:id="rId7"/>
-    <p:sldId id="423" r:id="rId8"/>
-    <p:sldId id="424" r:id="rId9"/>
-    <p:sldId id="425" r:id="rId10"/>
+    <p:sldId id="423" r:id="rId7"/>
+    <p:sldId id="424" r:id="rId8"/>
+    <p:sldId id="425" r:id="rId9"/>
+    <p:sldId id="817" r:id="rId10"/>
   </p:sldIdLst>
   <p:sldSz cx="9144000" cy="6858000" type="screen4x3"/>
   <p:notesSz cx="6858000" cy="9144000"/>
@@ -222,7 +222,7 @@
           <a:p>
             <a:fld id="{B0C0A60C-850A-4EA4-9C14-A8FE98B94505}" type="datetimeFigureOut">
               <a:rPr lang="en-US" smtClean="0"/>
-              <a:t>6/3/20</a:t>
+              <a:t>6/10/20</a:t>
             </a:fld>
             <a:endParaRPr lang="en-US"/>
           </a:p>
@@ -621,7 +621,7 @@
           <a:p>
             <a:fld id="{5738B90E-0779-4C36-915C-6F05FCD89456}" type="datetime1">
               <a:rPr lang="en-US" smtClean="0"/>
-              <a:t>6/3/20</a:t>
+              <a:t>6/10/20</a:t>
             </a:fld>
             <a:endParaRPr lang="en-US"/>
           </a:p>
@@ -818,7 +818,7 @@
           <a:p>
             <a:fld id="{7B9EA29D-D431-42FE-B7B6-AAE4454C77D3}" type="datetime1">
               <a:rPr lang="en-US" smtClean="0"/>
-              <a:t>6/3/20</a:t>
+              <a:t>6/10/20</a:t>
             </a:fld>
             <a:endParaRPr lang="en-US"/>
           </a:p>
@@ -1173,7 +1173,7 @@
           <a:p>
             <a:fld id="{690D8A1E-EA8F-46C1-B891-AE0C00D9C314}" type="datetime1">
               <a:rPr lang="en-US" smtClean="0"/>
-              <a:t>6/3/20</a:t>
+              <a:t>6/10/20</a:t>
             </a:fld>
             <a:endParaRPr lang="en-US"/>
           </a:p>
@@ -1481,7 +1481,7 @@
           <a:p>
             <a:fld id="{D753EFC8-4232-4598-94F6-94C0EBAFC469}" type="datetime1">
               <a:rPr lang="en-US" smtClean="0"/>
-              <a:t>6/3/20</a:t>
+              <a:t>6/10/20</a:t>
             </a:fld>
             <a:endParaRPr lang="en-US"/>
           </a:p>
@@ -1810,7 +1810,7 @@
           <a:p>
             <a:fld id="{F3161074-1C18-4AE7-957D-F18524378C85}" type="datetime1">
               <a:rPr lang="en-US" smtClean="0"/>
-              <a:t>6/3/20</a:t>
+              <a:t>6/10/20</a:t>
             </a:fld>
             <a:endParaRPr lang="en-US"/>
           </a:p>
@@ -2063,7 +2063,7 @@
           <a:p>
             <a:fld id="{69BE256C-8D9A-4404-B47D-41A1AE514425}" type="datetime1">
               <a:rPr lang="en-US" smtClean="0"/>
-              <a:t>6/3/20</a:t>
+              <a:t>6/10/20</a:t>
             </a:fld>
             <a:endParaRPr lang="en-US"/>
           </a:p>
@@ -2511,7 +2511,7 @@
           <a:p>
             <a:fld id="{66CB2154-9035-4012-8189-BAAB61C5A5EE}" type="datetime1">
               <a:rPr lang="en-US" smtClean="0"/>
-              <a:t>6/3/20</a:t>
+              <a:t>6/10/20</a:t>
             </a:fld>
             <a:endParaRPr lang="en-US"/>
           </a:p>
@@ -2699,7 +2699,7 @@
           <a:p>
             <a:fld id="{6700A58B-DD98-43D0-B791-721480A02982}" type="datetime1">
               <a:rPr lang="en-US" smtClean="0"/>
-              <a:t>6/3/20</a:t>
+              <a:t>6/10/20</a:t>
             </a:fld>
             <a:endParaRPr lang="en-US"/>
           </a:p>
@@ -2905,7 +2905,7 @@
           <a:p>
             <a:fld id="{7DB6E382-4F61-4E24-BE1A-377EC83D0E3A}" type="datetime1">
               <a:rPr lang="en-US" smtClean="0"/>
-              <a:t>6/3/20</a:t>
+              <a:t>6/10/20</a:t>
             </a:fld>
             <a:endParaRPr lang="en-US"/>
           </a:p>
@@ -3311,7 +3311,7 @@
           <a:p>
             <a:fld id="{4142EED6-FC16-45B9-B8C4-2BC5DBA88325}" type="datetime1">
               <a:rPr lang="en-US" smtClean="0"/>
-              <a:t>6/3/20</a:t>
+              <a:t>6/10/20</a:t>
             </a:fld>
             <a:endParaRPr lang="en-US"/>
           </a:p>
@@ -3643,7 +3643,7 @@
           <a:p>
             <a:fld id="{DF59512B-4F1D-43D7-8819-2F53FEF69650}" type="datetime1">
               <a:rPr lang="en-US" smtClean="0"/>
-              <a:t>6/3/20</a:t>
+              <a:t>6/10/20</a:t>
             </a:fld>
             <a:endParaRPr lang="en-US"/>
           </a:p>
@@ -3933,7 +3933,7 @@
           <a:p>
             <a:fld id="{08437B94-E2BF-44DC-ADC5-B05FC9934E9D}" type="datetime1">
               <a:rPr lang="en-US" smtClean="0"/>
-              <a:t>6/3/20</a:t>
+              <a:t>6/10/20</a:t>
             </a:fld>
             <a:endParaRPr lang="en-US"/>
           </a:p>
@@ -4406,7 +4406,7 @@
             <a:fld id="{6700A58B-DD98-43D0-B791-721480A02982}" type="datetime1">
               <a:rPr lang="en-US" smtClean="0"/>
               <a:pPr/>
-              <a:t>6/3/20</a:t>
+              <a:t>6/10/20</a:t>
             </a:fld>
             <a:endParaRPr lang="en-US"/>
           </a:p>
@@ -4687,7 +4687,7 @@
             <a:fld id="{9B19E99B-5349-415A-8E56-8E989211A366}" type="datetime1">
               <a:rPr lang="en-US" smtClean="0"/>
               <a:pPr/>
-              <a:t>6/3/20</a:t>
+              <a:t>6/10/20</a:t>
             </a:fld>
             <a:endParaRPr lang="en-US"/>
           </a:p>
@@ -4942,7 +4942,7 @@
             <a:fld id="{6700A58B-DD98-43D0-B791-721480A02982}" type="datetime1">
               <a:rPr lang="en-US" smtClean="0"/>
               <a:pPr/>
-              <a:t>6/3/20</a:t>
+              <a:t>6/10/20</a:t>
             </a:fld>
             <a:endParaRPr lang="en-US"/>
           </a:p>
@@ -5613,7 +5613,7 @@
             <a:fld id="{6700A58B-DD98-43D0-B791-721480A02982}" type="datetime1">
               <a:rPr lang="en-US" smtClean="0"/>
               <a:pPr/>
-              <a:t>6/3/20</a:t>
+              <a:t>6/10/20</a:t>
             </a:fld>
             <a:endParaRPr lang="en-US"/>
           </a:p>
@@ -6414,7 +6414,7 @@
             <a:fld id="{6700A58B-DD98-43D0-B791-721480A02982}" type="datetime1">
               <a:rPr lang="en-US" smtClean="0"/>
               <a:pPr/>
-              <a:t>6/3/20</a:t>
+              <a:t>6/10/20</a:t>
             </a:fld>
             <a:endParaRPr lang="en-US"/>
           </a:p>
@@ -6726,128 +6726,248 @@
           <a:chExt cx="0" cy="0"/>
         </a:xfrm>
       </p:grpSpPr>
-      <p:sp>
-        <p:nvSpPr>
-          <p:cNvPr id="2" name="Date Placeholder 1">
+      <p:pic>
+        <p:nvPicPr>
+          <p:cNvPr id="7" name="Picture 6"/>
+          <p:cNvPicPr>
+            <a:picLocks noChangeAspect="1"/>
+          </p:cNvPicPr>
+          <p:nvPr/>
+        </p:nvPicPr>
+        <p:blipFill>
+          <a:blip r:embed="rId2"/>
+          <a:stretch>
+            <a:fillRect/>
+          </a:stretch>
+        </p:blipFill>
+        <p:spPr>
+          <a:xfrm>
+            <a:off x="1205915" y="1306930"/>
+            <a:ext cx="6315075" cy="4629150"/>
+          </a:xfrm>
+          <a:prstGeom prst="rect">
+            <a:avLst/>
+          </a:prstGeom>
+        </p:spPr>
+      </p:pic>
+      <p:sp>
+        <p:nvSpPr>
+          <p:cNvPr id="2" name="Date Placeholder 1"/>
+          <p:cNvSpPr>
+            <a:spLocks noGrp="1"/>
+          </p:cNvSpPr>
+          <p:nvPr>
+            <p:ph type="dt" sz="half" idx="10"/>
+          </p:nvPr>
+        </p:nvSpPr>
+        <p:spPr/>
+        <p:txBody>
+          <a:bodyPr/>
+          <a:lstStyle/>
+          <a:p>
+            <a:fld id="{6700A58B-DD98-43D0-B791-721480A02982}" type="datetime1">
+              <a:rPr lang="en-US" smtClean="0"/>
+              <a:pPr/>
+              <a:t>6/10/20</a:t>
+            </a:fld>
+            <a:endParaRPr lang="en-US"/>
+          </a:p>
+        </p:txBody>
+      </p:sp>
+      <p:sp>
+        <p:nvSpPr>
+          <p:cNvPr id="3" name="Title 2"/>
+          <p:cNvSpPr>
+            <a:spLocks noGrp="1"/>
+          </p:cNvSpPr>
+          <p:nvPr>
+            <p:ph type="title"/>
+          </p:nvPr>
+        </p:nvSpPr>
+        <p:spPr/>
+        <p:txBody>
+          <a:bodyPr/>
+          <a:lstStyle/>
+          <a:p>
+            <a:r>
+              <a:rPr lang="en-US" dirty="0"/>
+              <a:t>Highlights of a fit summary</a:t>
+            </a:r>
+          </a:p>
+        </p:txBody>
+      </p:sp>
+      <p:sp>
+        <p:nvSpPr>
+          <p:cNvPr id="5" name="Footer Placeholder 4"/>
+          <p:cNvSpPr>
+            <a:spLocks noGrp="1"/>
+          </p:cNvSpPr>
+          <p:nvPr>
+            <p:ph type="ftr" sz="quarter" idx="3"/>
+          </p:nvPr>
+        </p:nvSpPr>
+        <p:spPr/>
+        <p:txBody>
+          <a:bodyPr/>
+          <a:lstStyle/>
+          <a:p>
+            <a:r>
+              <a:rPr lang="en-US"/>
+              <a:t>Kwartler CSCI S-96</a:t>
+            </a:r>
+            <a:endParaRPr lang="en-US" dirty="0"/>
+          </a:p>
+        </p:txBody>
+      </p:sp>
+      <p:sp>
+        <p:nvSpPr>
+          <p:cNvPr id="4" name="Slide Number Placeholder 3"/>
+          <p:cNvSpPr>
+            <a:spLocks noGrp="1"/>
+          </p:cNvSpPr>
+          <p:nvPr>
+            <p:ph type="sldNum" sz="quarter" idx="4294967295"/>
+          </p:nvPr>
+        </p:nvSpPr>
+        <p:spPr/>
+        <p:txBody>
+          <a:bodyPr/>
+          <a:lstStyle/>
+          <a:p>
+            <a:fld id="{37290FF7-652B-4475-AEAB-8B1A5D23AE09}" type="slidenum">
+              <a:rPr lang="en-US" smtClean="0"/>
+              <a:t>6</a:t>
+            </a:fld>
+            <a:endParaRPr lang="en-US"/>
+          </a:p>
+        </p:txBody>
+      </p:sp>
+      <p:cxnSp>
+        <p:nvCxnSpPr>
+          <p:cNvPr id="10" name="Straight Arrow Connector 9"/>
+          <p:cNvCxnSpPr>
+            <a:stCxn id="16" idx="3"/>
+            <a:endCxn id="13" idx="2"/>
+          </p:cNvCxnSpPr>
+          <p:nvPr/>
+        </p:nvCxnSpPr>
+        <p:spPr>
+          <a:xfrm flipV="1">
+            <a:off x="3064042" y="2011680"/>
+            <a:ext cx="4882925" cy="1936136"/>
+          </a:xfrm>
+          <a:prstGeom prst="straightConnector1">
+            <a:avLst/>
+          </a:prstGeom>
+          <a:ln>
+            <a:tailEnd type="triangle"/>
+          </a:ln>
+        </p:spPr>
+        <p:style>
+          <a:lnRef idx="1">
+            <a:schemeClr val="accent1"/>
+          </a:lnRef>
+          <a:fillRef idx="0">
+            <a:schemeClr val="accent1"/>
+          </a:fillRef>
+          <a:effectRef idx="0">
+            <a:schemeClr val="accent1"/>
+          </a:effectRef>
+          <a:fontRef idx="minor">
+            <a:schemeClr val="tx1"/>
+          </a:fontRef>
+        </p:style>
+      </p:cxnSp>
+      <p:sp>
+        <p:nvSpPr>
+          <p:cNvPr id="13" name="Rounded Rectangle 12"/>
+          <p:cNvSpPr/>
+          <p:nvPr/>
+        </p:nvSpPr>
+        <p:spPr>
+          <a:xfrm>
+            <a:off x="7065818" y="1496291"/>
+            <a:ext cx="1762298" cy="515389"/>
+          </a:xfrm>
+          <a:prstGeom prst="roundRect">
+            <a:avLst/>
+          </a:prstGeom>
+        </p:spPr>
+        <p:style>
+          <a:lnRef idx="2">
+            <a:schemeClr val="accent1">
+              <a:shade val="50000"/>
+            </a:schemeClr>
+          </a:lnRef>
+          <a:fillRef idx="1">
+            <a:schemeClr val="accent1"/>
+          </a:fillRef>
+          <a:effectRef idx="0">
+            <a:schemeClr val="accent1"/>
+          </a:effectRef>
+          <a:fontRef idx="minor">
+            <a:schemeClr val="lt1"/>
+          </a:fontRef>
+        </p:style>
+        <p:txBody>
+          <a:bodyPr rtlCol="0" anchor="ctr"/>
+          <a:lstStyle/>
+          <a:p>
+            <a:pPr algn="ctr"/>
+            <a:r>
+              <a:rPr lang="en-US" sz="1200" dirty="0"/>
+              <a:t>Treated Variable Names i.e. informative features</a:t>
+            </a:r>
+          </a:p>
+        </p:txBody>
+      </p:sp>
+      <p:sp>
+        <p:nvSpPr>
+          <p:cNvPr id="16" name="Rounded Rectangle 15"/>
+          <p:cNvSpPr/>
+          <p:nvPr/>
+        </p:nvSpPr>
+        <p:spPr>
+          <a:xfrm>
+            <a:off x="1097280" y="2826327"/>
+            <a:ext cx="1966762" cy="2242978"/>
+          </a:xfrm>
+          <a:prstGeom prst="roundRect">
+            <a:avLst/>
+          </a:prstGeom>
+          <a:noFill/>
+        </p:spPr>
+        <p:style>
+          <a:lnRef idx="2">
+            <a:schemeClr val="accent1">
+              <a:shade val="50000"/>
+            </a:schemeClr>
+          </a:lnRef>
+          <a:fillRef idx="1">
+            <a:schemeClr val="accent1"/>
+          </a:fillRef>
+          <a:effectRef idx="0">
+            <a:schemeClr val="accent1"/>
+          </a:effectRef>
+          <a:fontRef idx="minor">
+            <a:schemeClr val="lt1"/>
+          </a:fontRef>
+        </p:style>
+        <p:txBody>
+          <a:bodyPr rtlCol="0" anchor="ctr"/>
+          <a:lstStyle/>
+          <a:p>
+            <a:pPr algn="ctr"/>
+            <a:endParaRPr lang="en-US"/>
+          </a:p>
+        </p:txBody>
+      </p:sp>
+      <p:cxnSp>
+        <p:nvCxnSpPr>
+          <p:cNvPr id="11" name="Straight Connector 10">
             <a:extLst>
               <a:ext uri="{FF2B5EF4-FFF2-40B4-BE49-F238E27FC236}">
-                <a16:creationId xmlns:a16="http://schemas.microsoft.com/office/drawing/2014/main" id="{6AC338A7-2631-4CAB-8FD1-FA2B9EFBDFF3}"/>
-              </a:ext>
-            </a:extLst>
-          </p:cNvPr>
-          <p:cNvSpPr>
-            <a:spLocks noGrp="1"/>
-          </p:cNvSpPr>
-          <p:nvPr>
-            <p:ph type="dt" sz="half" idx="10"/>
-          </p:nvPr>
-        </p:nvSpPr>
-        <p:spPr/>
-        <p:txBody>
-          <a:bodyPr/>
-          <a:lstStyle/>
-          <a:p>
-            <a:fld id="{6700A58B-DD98-43D0-B791-721480A02982}" type="datetime1">
-              <a:rPr lang="en-US" smtClean="0"/>
-              <a:t>6/3/20</a:t>
-            </a:fld>
-            <a:endParaRPr lang="en-US"/>
-          </a:p>
-        </p:txBody>
-      </p:sp>
-      <p:sp>
-        <p:nvSpPr>
-          <p:cNvPr id="3" name="Title 2">
-            <a:extLst>
-              <a:ext uri="{FF2B5EF4-FFF2-40B4-BE49-F238E27FC236}">
-                <a16:creationId xmlns:a16="http://schemas.microsoft.com/office/drawing/2014/main" id="{0ED96815-0C83-42CE-AC07-527ACA7FAD64}"/>
-              </a:ext>
-            </a:extLst>
-          </p:cNvPr>
-          <p:cNvSpPr>
-            <a:spLocks noGrp="1"/>
-          </p:cNvSpPr>
-          <p:nvPr>
-            <p:ph type="title"/>
-          </p:nvPr>
-        </p:nvSpPr>
-        <p:spPr/>
-        <p:txBody>
-          <a:bodyPr/>
-          <a:lstStyle/>
-          <a:p>
-            <a:r>
-              <a:rPr lang="en-US" dirty="0"/>
-              <a:t>Open B_Regression_v1.R</a:t>
-            </a:r>
-          </a:p>
-        </p:txBody>
-      </p:sp>
-      <p:sp>
-        <p:nvSpPr>
-          <p:cNvPr id="4" name="Footer Placeholder 3">
-            <a:extLst>
-              <a:ext uri="{FF2B5EF4-FFF2-40B4-BE49-F238E27FC236}">
-                <a16:creationId xmlns:a16="http://schemas.microsoft.com/office/drawing/2014/main" id="{0712987C-E3A6-42DD-AFFF-EB8A2EBC4971}"/>
-              </a:ext>
-            </a:extLst>
-          </p:cNvPr>
-          <p:cNvSpPr>
-            <a:spLocks noGrp="1"/>
-          </p:cNvSpPr>
-          <p:nvPr>
-            <p:ph type="ftr" sz="quarter" idx="3"/>
-          </p:nvPr>
-        </p:nvSpPr>
-        <p:spPr/>
-        <p:txBody>
-          <a:bodyPr/>
-          <a:lstStyle/>
-          <a:p>
-            <a:r>
-              <a:rPr lang="en-US"/>
-              <a:t>Kwartler</a:t>
-            </a:r>
-            <a:endParaRPr lang="en-US" dirty="0"/>
-          </a:p>
-        </p:txBody>
-      </p:sp>
-      <p:sp>
-        <p:nvSpPr>
-          <p:cNvPr id="5" name="Slide Number Placeholder 4">
-            <a:extLst>
-              <a:ext uri="{FF2B5EF4-FFF2-40B4-BE49-F238E27FC236}">
-                <a16:creationId xmlns:a16="http://schemas.microsoft.com/office/drawing/2014/main" id="{5FAE7633-B0A8-4E26-B238-66B7D58C336F}"/>
-              </a:ext>
-            </a:extLst>
-          </p:cNvPr>
-          <p:cNvSpPr>
-            <a:spLocks noGrp="1"/>
-          </p:cNvSpPr>
-          <p:nvPr>
-            <p:ph type="sldNum" sz="quarter" idx="4"/>
-          </p:nvPr>
-        </p:nvSpPr>
-        <p:spPr/>
-        <p:txBody>
-          <a:bodyPr/>
-          <a:lstStyle/>
-          <a:p>
-            <a:fld id="{37290FF7-652B-4475-AEAB-8B1A5D23AE09}" type="slidenum">
-              <a:rPr lang="en-US" smtClean="0"/>
-              <a:pPr/>
-              <a:t>6</a:t>
-            </a:fld>
-            <a:endParaRPr lang="en-US" dirty="0"/>
-          </a:p>
-        </p:txBody>
-      </p:sp>
-      <p:cxnSp>
-        <p:nvCxnSpPr>
-          <p:cNvPr id="6" name="Straight Connector 5">
-            <a:extLst>
-              <a:ext uri="{FF2B5EF4-FFF2-40B4-BE49-F238E27FC236}">
-                <a16:creationId xmlns:a16="http://schemas.microsoft.com/office/drawing/2014/main" id="{92AA9403-8033-6A46-8310-CE6741106277}"/>
+                <a16:creationId xmlns:a16="http://schemas.microsoft.com/office/drawing/2014/main" id="{983B008A-FAA6-EF4B-8FC5-AA7CC51E5712}"/>
               </a:ext>
             </a:extLst>
           </p:cNvPr>
@@ -6887,10 +7007,10 @@
       </p:cxnSp>
       <p:cxnSp>
         <p:nvCxnSpPr>
-          <p:cNvPr id="7" name="Straight Connector 6">
+          <p:cNvPr id="12" name="Straight Connector 11">
             <a:extLst>
               <a:ext uri="{FF2B5EF4-FFF2-40B4-BE49-F238E27FC236}">
-                <a16:creationId xmlns:a16="http://schemas.microsoft.com/office/drawing/2014/main" id="{BB668BBE-B24A-BD43-AED1-831C03D746CB}"/>
+                <a16:creationId xmlns:a16="http://schemas.microsoft.com/office/drawing/2014/main" id="{0CCFCEAD-9FFF-984C-A9A9-9AA60B6B393D}"/>
               </a:ext>
             </a:extLst>
           </p:cNvPr>
@@ -6931,7 +7051,7 @@
     </p:spTree>
     <p:extLst>
       <p:ext uri="{BB962C8B-B14F-4D97-AF65-F5344CB8AC3E}">
-        <p14:creationId xmlns:p14="http://schemas.microsoft.com/office/powerpoint/2010/main" val="3490178288"/>
+        <p14:creationId xmlns:p14="http://schemas.microsoft.com/office/powerpoint/2010/main" val="1590685035"/>
       </p:ext>
     </p:extLst>
   </p:cSld>
@@ -6974,7 +7094,7 @@
         </p:blipFill>
         <p:spPr>
           <a:xfrm>
-            <a:off x="1205915" y="1306930"/>
+            <a:off x="1414462" y="1114425"/>
             <a:ext cx="6315075" cy="4629150"/>
           </a:xfrm>
           <a:prstGeom prst="rect">
@@ -7000,7 +7120,7 @@
             <a:fld id="{6700A58B-DD98-43D0-B791-721480A02982}" type="datetime1">
               <a:rPr lang="en-US" smtClean="0"/>
               <a:pPr/>
-              <a:t>6/3/20</a:t>
+              <a:t>6/10/20</a:t>
             </a:fld>
             <a:endParaRPr lang="en-US"/>
           </a:p>
@@ -7085,8 +7205,8 @@
         </p:nvCxnSpPr>
         <p:spPr>
           <a:xfrm flipV="1">
-            <a:off x="3064042" y="2011680"/>
-            <a:ext cx="4882925" cy="1936136"/>
+            <a:off x="4344780" y="2011680"/>
+            <a:ext cx="3602187" cy="1689671"/>
           </a:xfrm>
           <a:prstGeom prst="straightConnector1">
             <a:avLst/>
@@ -7148,7 +7268,7 @@
             <a:pPr algn="ctr"/>
             <a:r>
               <a:rPr lang="en-US" sz="1200" dirty="0"/>
-              <a:t>Treated Variable Names i.e. informative features</a:t>
+              <a:t>Coefficients or Beta values</a:t>
             </a:r>
           </a:p>
         </p:txBody>
@@ -7161,8 +7281,8 @@
         </p:nvSpPr>
         <p:spPr>
           <a:xfrm>
-            <a:off x="1097280" y="2826327"/>
-            <a:ext cx="1966762" cy="2242978"/>
+            <a:off x="3114502" y="2537569"/>
+            <a:ext cx="1230278" cy="2327564"/>
           </a:xfrm>
           <a:prstGeom prst="roundRect">
             <a:avLst/>
@@ -7199,7 +7319,7 @@
           <p:cNvPr id="11" name="Straight Connector 10">
             <a:extLst>
               <a:ext uri="{FF2B5EF4-FFF2-40B4-BE49-F238E27FC236}">
-                <a16:creationId xmlns:a16="http://schemas.microsoft.com/office/drawing/2014/main" id="{983B008A-FAA6-EF4B-8FC5-AA7CC51E5712}"/>
+                <a16:creationId xmlns:a16="http://schemas.microsoft.com/office/drawing/2014/main" id="{731EC679-A7DA-BB49-B2C7-101E0D399ACD}"/>
               </a:ext>
             </a:extLst>
           </p:cNvPr>
@@ -7242,7 +7362,7 @@
           <p:cNvPr id="12" name="Straight Connector 11">
             <a:extLst>
               <a:ext uri="{FF2B5EF4-FFF2-40B4-BE49-F238E27FC236}">
-                <a16:creationId xmlns:a16="http://schemas.microsoft.com/office/drawing/2014/main" id="{0CCFCEAD-9FFF-984C-A9A9-9AA60B6B393D}"/>
+                <a16:creationId xmlns:a16="http://schemas.microsoft.com/office/drawing/2014/main" id="{1F52551E-DF8F-1C4D-9FC3-5A96A11AC20F}"/>
               </a:ext>
             </a:extLst>
           </p:cNvPr>
@@ -7283,7 +7403,7 @@
     </p:spTree>
     <p:extLst>
       <p:ext uri="{BB962C8B-B14F-4D97-AF65-F5344CB8AC3E}">
-        <p14:creationId xmlns:p14="http://schemas.microsoft.com/office/powerpoint/2010/main" val="1590685035"/>
+        <p14:creationId xmlns:p14="http://schemas.microsoft.com/office/powerpoint/2010/main" val="164623185"/>
       </p:ext>
     </p:extLst>
   </p:cSld>
@@ -7326,7 +7446,7 @@
         </p:blipFill>
         <p:spPr>
           <a:xfrm>
-            <a:off x="1414462" y="1114425"/>
+            <a:off x="1141747" y="1355057"/>
             <a:ext cx="6315075" cy="4629150"/>
           </a:xfrm>
           <a:prstGeom prst="rect">
@@ -7352,7 +7472,7 @@
             <a:fld id="{6700A58B-DD98-43D0-B791-721480A02982}" type="datetime1">
               <a:rPr lang="en-US" smtClean="0"/>
               <a:pPr/>
-              <a:t>6/3/20</a:t>
+              <a:t>6/10/20</a:t>
             </a:fld>
             <a:endParaRPr lang="en-US"/>
           </a:p>
@@ -7437,8 +7557,8 @@
         </p:nvCxnSpPr>
         <p:spPr>
           <a:xfrm flipV="1">
-            <a:off x="4344780" y="2011680"/>
-            <a:ext cx="3602187" cy="1689671"/>
+            <a:off x="4604084" y="2011680"/>
+            <a:ext cx="3168316" cy="249382"/>
           </a:xfrm>
           <a:prstGeom prst="straightConnector1">
             <a:avLst/>
@@ -7470,8 +7590,8 @@
         </p:nvSpPr>
         <p:spPr>
           <a:xfrm>
-            <a:off x="7065818" y="1496291"/>
-            <a:ext cx="1762298" cy="515389"/>
+            <a:off x="6716684" y="1496291"/>
+            <a:ext cx="2111432" cy="515389"/>
           </a:xfrm>
           <a:prstGeom prst="roundRect">
             <a:avLst/>
@@ -7500,7 +7620,14 @@
             <a:pPr algn="ctr"/>
             <a:r>
               <a:rPr lang="en-US" sz="1200" dirty="0"/>
-              <a:t>Coefficients or Beta values</a:t>
+              <a:t>Another name for errors.</a:t>
+            </a:r>
+          </a:p>
+          <a:p>
+            <a:pPr algn="ctr"/>
+            <a:r>
+              <a:rPr lang="en-US" sz="1200" dirty="0"/>
+              <a:t>Summary stats for the errors.</a:t>
             </a:r>
           </a:p>
         </p:txBody>
@@ -7513,8 +7640,8 @@
         </p:nvSpPr>
         <p:spPr>
           <a:xfrm>
-            <a:off x="3114502" y="2537569"/>
-            <a:ext cx="1230278" cy="2327564"/>
+            <a:off x="1097279" y="1945178"/>
+            <a:ext cx="3506805" cy="631767"/>
           </a:xfrm>
           <a:prstGeom prst="roundRect">
             <a:avLst/>
@@ -7551,7 +7678,7 @@
           <p:cNvPr id="11" name="Straight Connector 10">
             <a:extLst>
               <a:ext uri="{FF2B5EF4-FFF2-40B4-BE49-F238E27FC236}">
-                <a16:creationId xmlns:a16="http://schemas.microsoft.com/office/drawing/2014/main" id="{731EC679-A7DA-BB49-B2C7-101E0D399ACD}"/>
+                <a16:creationId xmlns:a16="http://schemas.microsoft.com/office/drawing/2014/main" id="{E7C30F46-618E-5144-A15A-C47543BBEC25}"/>
               </a:ext>
             </a:extLst>
           </p:cNvPr>
@@ -7594,7 +7721,7 @@
           <p:cNvPr id="12" name="Straight Connector 11">
             <a:extLst>
               <a:ext uri="{FF2B5EF4-FFF2-40B4-BE49-F238E27FC236}">
-                <a16:creationId xmlns:a16="http://schemas.microsoft.com/office/drawing/2014/main" id="{1F52551E-DF8F-1C4D-9FC3-5A96A11AC20F}"/>
+                <a16:creationId xmlns:a16="http://schemas.microsoft.com/office/drawing/2014/main" id="{D0FCAED0-17FA-9743-9EBA-A20CD1853D9A}"/>
               </a:ext>
             </a:extLst>
           </p:cNvPr>
@@ -7635,7 +7762,7 @@
     </p:spTree>
     <p:extLst>
       <p:ext uri="{BB962C8B-B14F-4D97-AF65-F5344CB8AC3E}">
-        <p14:creationId xmlns:p14="http://schemas.microsoft.com/office/powerpoint/2010/main" val="164623185"/>
+        <p14:creationId xmlns:p14="http://schemas.microsoft.com/office/powerpoint/2010/main" val="1373202444"/>
       </p:ext>
     </p:extLst>
   </p:cSld>
@@ -7662,33 +7789,15 @@
           <a:chExt cx="0" cy="0"/>
         </a:xfrm>
       </p:grpSpPr>
-      <p:pic>
-        <p:nvPicPr>
-          <p:cNvPr id="7" name="Picture 6"/>
-          <p:cNvPicPr>
-            <a:picLocks noChangeAspect="1"/>
-          </p:cNvPicPr>
-          <p:nvPr/>
-        </p:nvPicPr>
-        <p:blipFill>
-          <a:blip r:embed="rId2"/>
-          <a:stretch>
-            <a:fillRect/>
-          </a:stretch>
-        </p:blipFill>
-        <p:spPr>
-          <a:xfrm>
-            <a:off x="1141747" y="1355057"/>
-            <a:ext cx="6315075" cy="4629150"/>
-          </a:xfrm>
-          <a:prstGeom prst="rect">
-            <a:avLst/>
-          </a:prstGeom>
-        </p:spPr>
-      </p:pic>
-      <p:sp>
-        <p:nvSpPr>
-          <p:cNvPr id="2" name="Date Placeholder 1"/>
+      <p:sp>
+        <p:nvSpPr>
+          <p:cNvPr id="2" name="Date Placeholder 1">
+            <a:extLst>
+              <a:ext uri="{FF2B5EF4-FFF2-40B4-BE49-F238E27FC236}">
+                <a16:creationId xmlns:a16="http://schemas.microsoft.com/office/drawing/2014/main" id="{6AC338A7-2631-4CAB-8FD1-FA2B9EFBDFF3}"/>
+              </a:ext>
+            </a:extLst>
+          </p:cNvPr>
           <p:cNvSpPr>
             <a:spLocks noGrp="1"/>
           </p:cNvSpPr>
@@ -7703,8 +7812,7 @@
           <a:p>
             <a:fld id="{6700A58B-DD98-43D0-B791-721480A02982}" type="datetime1">
               <a:rPr lang="en-US" smtClean="0"/>
-              <a:pPr/>
-              <a:t>6/3/20</a:t>
+              <a:t>6/10/20</a:t>
             </a:fld>
             <a:endParaRPr lang="en-US"/>
           </a:p>
@@ -7712,7 +7820,13 @@
       </p:sp>
       <p:sp>
         <p:nvSpPr>
-          <p:cNvPr id="3" name="Title 2"/>
+          <p:cNvPr id="3" name="Title 2">
+            <a:extLst>
+              <a:ext uri="{FF2B5EF4-FFF2-40B4-BE49-F238E27FC236}">
+                <a16:creationId xmlns:a16="http://schemas.microsoft.com/office/drawing/2014/main" id="{0ED96815-0C83-42CE-AC07-527ACA7FAD64}"/>
+              </a:ext>
+            </a:extLst>
+          </p:cNvPr>
           <p:cNvSpPr>
             <a:spLocks noGrp="1"/>
           </p:cNvSpPr>
@@ -7727,14 +7841,20 @@
           <a:p>
             <a:r>
               <a:rPr lang="en-US" dirty="0"/>
-              <a:t>Highlights of a fit summary</a:t>
-            </a:r>
-          </a:p>
-        </p:txBody>
-      </p:sp>
-      <p:sp>
-        <p:nvSpPr>
-          <p:cNvPr id="5" name="Footer Placeholder 4"/>
+              <a:t>Open B_Regression_v1.R</a:t>
+            </a:r>
+          </a:p>
+        </p:txBody>
+      </p:sp>
+      <p:sp>
+        <p:nvSpPr>
+          <p:cNvPr id="4" name="Footer Placeholder 3">
+            <a:extLst>
+              <a:ext uri="{FF2B5EF4-FFF2-40B4-BE49-F238E27FC236}">
+                <a16:creationId xmlns:a16="http://schemas.microsoft.com/office/drawing/2014/main" id="{0712987C-E3A6-42DD-AFFF-EB8A2EBC4971}"/>
+              </a:ext>
+            </a:extLst>
+          </p:cNvPr>
           <p:cNvSpPr>
             <a:spLocks noGrp="1"/>
           </p:cNvSpPr>
@@ -7749,7 +7869,7 @@
           <a:p>
             <a:r>
               <a:rPr lang="en-US"/>
-              <a:t>Kwartler CSCI S-96</a:t>
+              <a:t>Kwartler</a:t>
             </a:r>
             <a:endParaRPr lang="en-US" dirty="0"/>
           </a:p>
@@ -7757,12 +7877,18 @@
       </p:sp>
       <p:sp>
         <p:nvSpPr>
-          <p:cNvPr id="4" name="Slide Number Placeholder 3"/>
-          <p:cNvSpPr>
-            <a:spLocks noGrp="1"/>
-          </p:cNvSpPr>
-          <p:nvPr>
-            <p:ph type="sldNum" sz="quarter" idx="4294967295"/>
+          <p:cNvPr id="5" name="Slide Number Placeholder 4">
+            <a:extLst>
+              <a:ext uri="{FF2B5EF4-FFF2-40B4-BE49-F238E27FC236}">
+                <a16:creationId xmlns:a16="http://schemas.microsoft.com/office/drawing/2014/main" id="{5FAE7633-B0A8-4E26-B238-66B7D58C336F}"/>
+              </a:ext>
+            </a:extLst>
+          </p:cNvPr>
+          <p:cNvSpPr>
+            <a:spLocks noGrp="1"/>
+          </p:cNvSpPr>
+          <p:nvPr>
+            <p:ph type="sldNum" sz="quarter" idx="4"/>
           </p:nvPr>
         </p:nvSpPr>
         <p:spPr/>
@@ -7772,145 +7898,19 @@
           <a:p>
             <a:fld id="{37290FF7-652B-4475-AEAB-8B1A5D23AE09}" type="slidenum">
               <a:rPr lang="en-US" smtClean="0"/>
+              <a:pPr/>
               <a:t>9</a:t>
             </a:fld>
-            <a:endParaRPr lang="en-US"/>
+            <a:endParaRPr lang="en-US" dirty="0"/>
           </a:p>
         </p:txBody>
       </p:sp>
       <p:cxnSp>
         <p:nvCxnSpPr>
-          <p:cNvPr id="10" name="Straight Arrow Connector 9"/>
-          <p:cNvCxnSpPr>
-            <a:stCxn id="16" idx="3"/>
-            <a:endCxn id="13" idx="2"/>
-          </p:cNvCxnSpPr>
-          <p:nvPr/>
-        </p:nvCxnSpPr>
-        <p:spPr>
-          <a:xfrm flipV="1">
-            <a:off x="4604084" y="2011680"/>
-            <a:ext cx="3168316" cy="249382"/>
-          </a:xfrm>
-          <a:prstGeom prst="straightConnector1">
-            <a:avLst/>
-          </a:prstGeom>
-          <a:ln>
-            <a:tailEnd type="triangle"/>
-          </a:ln>
-        </p:spPr>
-        <p:style>
-          <a:lnRef idx="1">
-            <a:schemeClr val="accent1"/>
-          </a:lnRef>
-          <a:fillRef idx="0">
-            <a:schemeClr val="accent1"/>
-          </a:fillRef>
-          <a:effectRef idx="0">
-            <a:schemeClr val="accent1"/>
-          </a:effectRef>
-          <a:fontRef idx="minor">
-            <a:schemeClr val="tx1"/>
-          </a:fontRef>
-        </p:style>
-      </p:cxnSp>
-      <p:sp>
-        <p:nvSpPr>
-          <p:cNvPr id="13" name="Rounded Rectangle 12"/>
-          <p:cNvSpPr/>
-          <p:nvPr/>
-        </p:nvSpPr>
-        <p:spPr>
-          <a:xfrm>
-            <a:off x="6716684" y="1496291"/>
-            <a:ext cx="2111432" cy="515389"/>
-          </a:xfrm>
-          <a:prstGeom prst="roundRect">
-            <a:avLst/>
-          </a:prstGeom>
-        </p:spPr>
-        <p:style>
-          <a:lnRef idx="2">
-            <a:schemeClr val="accent1">
-              <a:shade val="50000"/>
-            </a:schemeClr>
-          </a:lnRef>
-          <a:fillRef idx="1">
-            <a:schemeClr val="accent1"/>
-          </a:fillRef>
-          <a:effectRef idx="0">
-            <a:schemeClr val="accent1"/>
-          </a:effectRef>
-          <a:fontRef idx="minor">
-            <a:schemeClr val="lt1"/>
-          </a:fontRef>
-        </p:style>
-        <p:txBody>
-          <a:bodyPr rtlCol="0" anchor="ctr"/>
-          <a:lstStyle/>
-          <a:p>
-            <a:pPr algn="ctr"/>
-            <a:r>
-              <a:rPr lang="en-US" sz="1200" dirty="0"/>
-              <a:t>Another name for errors.</a:t>
-            </a:r>
-          </a:p>
-          <a:p>
-            <a:pPr algn="ctr"/>
-            <a:r>
-              <a:rPr lang="en-US" sz="1200" dirty="0"/>
-              <a:t>Summary stats for the errors.</a:t>
-            </a:r>
-          </a:p>
-        </p:txBody>
-      </p:sp>
-      <p:sp>
-        <p:nvSpPr>
-          <p:cNvPr id="16" name="Rounded Rectangle 15"/>
-          <p:cNvSpPr/>
-          <p:nvPr/>
-        </p:nvSpPr>
-        <p:spPr>
-          <a:xfrm>
-            <a:off x="1097279" y="1945178"/>
-            <a:ext cx="3506805" cy="631767"/>
-          </a:xfrm>
-          <a:prstGeom prst="roundRect">
-            <a:avLst/>
-          </a:prstGeom>
-          <a:noFill/>
-        </p:spPr>
-        <p:style>
-          <a:lnRef idx="2">
-            <a:schemeClr val="accent1">
-              <a:shade val="50000"/>
-            </a:schemeClr>
-          </a:lnRef>
-          <a:fillRef idx="1">
-            <a:schemeClr val="accent1"/>
-          </a:fillRef>
-          <a:effectRef idx="0">
-            <a:schemeClr val="accent1"/>
-          </a:effectRef>
-          <a:fontRef idx="minor">
-            <a:schemeClr val="lt1"/>
-          </a:fontRef>
-        </p:style>
-        <p:txBody>
-          <a:bodyPr rtlCol="0" anchor="ctr"/>
-          <a:lstStyle/>
-          <a:p>
-            <a:pPr algn="ctr"/>
-            <a:endParaRPr lang="en-US"/>
-          </a:p>
-        </p:txBody>
-      </p:sp>
-      <p:cxnSp>
-        <p:nvCxnSpPr>
-          <p:cNvPr id="11" name="Straight Connector 10">
+          <p:cNvPr id="6" name="Straight Connector 5">
             <a:extLst>
               <a:ext uri="{FF2B5EF4-FFF2-40B4-BE49-F238E27FC236}">
-                <a16:creationId xmlns:a16="http://schemas.microsoft.com/office/drawing/2014/main" id="{E7C30F46-618E-5144-A15A-C47543BBEC25}"/>
+                <a16:creationId xmlns:a16="http://schemas.microsoft.com/office/drawing/2014/main" id="{92AA9403-8033-6A46-8310-CE6741106277}"/>
               </a:ext>
             </a:extLst>
           </p:cNvPr>
@@ -7950,10 +7950,10 @@
       </p:cxnSp>
       <p:cxnSp>
         <p:nvCxnSpPr>
-          <p:cNvPr id="12" name="Straight Connector 11">
+          <p:cNvPr id="7" name="Straight Connector 6">
             <a:extLst>
               <a:ext uri="{FF2B5EF4-FFF2-40B4-BE49-F238E27FC236}">
-                <a16:creationId xmlns:a16="http://schemas.microsoft.com/office/drawing/2014/main" id="{D0FCAED0-17FA-9743-9EBA-A20CD1853D9A}"/>
+                <a16:creationId xmlns:a16="http://schemas.microsoft.com/office/drawing/2014/main" id="{BB668BBE-B24A-BD43-AED1-831C03D746CB}"/>
               </a:ext>
             </a:extLst>
           </p:cNvPr>
@@ -7994,7 +7994,7 @@
     </p:spTree>
     <p:extLst>
       <p:ext uri="{BB962C8B-B14F-4D97-AF65-F5344CB8AC3E}">
-        <p14:creationId xmlns:p14="http://schemas.microsoft.com/office/powerpoint/2010/main" val="1373202444"/>
+        <p14:creationId xmlns:p14="http://schemas.microsoft.com/office/powerpoint/2010/main" val="3490178288"/>
       </p:ext>
     </p:extLst>
   </p:cSld>

</xml_diff>